<commit_message>
Week 1 slide up
</commit_message>
<xml_diff>
--- a/Week1.pptx
+++ b/Week1.pptx
@@ -134,6 +134,11 @@
       </a:defRPr>
     </a:lvl9pPr>
   </p:defaultTextStyle>
+  <p:extLst>
+    <p:ext uri="{EFAFB233-063F-42B5-8137-9DF3F51BA10A}">
+      <p15:sldGuideLst xmlns:p15="http://schemas.microsoft.com/office/powerpoint/2012/main"/>
+    </p:ext>
+  </p:extLst>
 </p:presentation>
 </file>
 
@@ -468,7 +473,7 @@
           <a:p>
             <a:fld id="{CFA30225-6533-4C0E-9BA0-6341D2E3A1C7}" type="datetimeFigureOut">
               <a:rPr lang="en-US" smtClean="0"/>
-              <a:t>1/9/2022</a:t>
+              <a:t>3/2/2022</a:t>
             </a:fld>
             <a:endParaRPr lang="en-US"/>
           </a:p>
@@ -792,7 +797,7 @@
           <a:p>
             <a:fld id="{CFA30225-6533-4C0E-9BA0-6341D2E3A1C7}" type="datetimeFigureOut">
               <a:rPr lang="en-US" smtClean="0"/>
-              <a:t>1/9/2022</a:t>
+              <a:t>3/2/2022</a:t>
             </a:fld>
             <a:endParaRPr lang="en-US"/>
           </a:p>
@@ -1040,7 +1045,7 @@
           <a:p>
             <a:fld id="{CFA30225-6533-4C0E-9BA0-6341D2E3A1C7}" type="datetimeFigureOut">
               <a:rPr lang="en-US" smtClean="0"/>
-              <a:t>1/9/2022</a:t>
+              <a:t>3/2/2022</a:t>
             </a:fld>
             <a:endParaRPr lang="en-US"/>
           </a:p>
@@ -1379,7 +1384,7 @@
           <a:p>
             <a:fld id="{CFA30225-6533-4C0E-9BA0-6341D2E3A1C7}" type="datetimeFigureOut">
               <a:rPr lang="en-US" smtClean="0"/>
-              <a:t>1/9/2022</a:t>
+              <a:t>3/2/2022</a:t>
             </a:fld>
             <a:endParaRPr lang="en-US"/>
           </a:p>
@@ -1726,7 +1731,7 @@
           <a:p>
             <a:fld id="{CFA30225-6533-4C0E-9BA0-6341D2E3A1C7}" type="datetimeFigureOut">
               <a:rPr lang="en-US" smtClean="0"/>
-              <a:t>1/9/2022</a:t>
+              <a:t>3/2/2022</a:t>
             </a:fld>
             <a:endParaRPr lang="en-US"/>
           </a:p>
@@ -2100,7 +2105,7 @@
           <a:p>
             <a:fld id="{CFA30225-6533-4C0E-9BA0-6341D2E3A1C7}" type="datetimeFigureOut">
               <a:rPr lang="en-US" smtClean="0"/>
-              <a:t>1/9/2022</a:t>
+              <a:t>3/2/2022</a:t>
             </a:fld>
             <a:endParaRPr lang="en-US"/>
           </a:p>
@@ -2570,7 +2575,7 @@
           <a:p>
             <a:fld id="{CFA30225-6533-4C0E-9BA0-6341D2E3A1C7}" type="datetimeFigureOut">
               <a:rPr lang="en-US" smtClean="0"/>
-              <a:t>1/9/2022</a:t>
+              <a:t>3/2/2022</a:t>
             </a:fld>
             <a:endParaRPr lang="en-US"/>
           </a:p>
@@ -2775,7 +2780,7 @@
           <a:p>
             <a:fld id="{CFA30225-6533-4C0E-9BA0-6341D2E3A1C7}" type="datetimeFigureOut">
               <a:rPr lang="en-US" smtClean="0"/>
-              <a:t>1/9/2022</a:t>
+              <a:t>3/2/2022</a:t>
             </a:fld>
             <a:endParaRPr lang="en-US"/>
           </a:p>
@@ -2986,7 +2991,7 @@
           <a:p>
             <a:fld id="{CFA30225-6533-4C0E-9BA0-6341D2E3A1C7}" type="datetimeFigureOut">
               <a:rPr lang="en-US" smtClean="0"/>
-              <a:t>1/9/2022</a:t>
+              <a:t>3/2/2022</a:t>
             </a:fld>
             <a:endParaRPr lang="en-US"/>
           </a:p>
@@ -3218,7 +3223,7 @@
           <a:p>
             <a:fld id="{CFA30225-6533-4C0E-9BA0-6341D2E3A1C7}" type="datetimeFigureOut">
               <a:rPr lang="en-US" smtClean="0"/>
-              <a:t>1/9/2022</a:t>
+              <a:t>3/2/2022</a:t>
             </a:fld>
             <a:endParaRPr lang="en-US"/>
           </a:p>
@@ -3466,7 +3471,7 @@
           <a:p>
             <a:fld id="{CFA30225-6533-4C0E-9BA0-6341D2E3A1C7}" type="datetimeFigureOut">
               <a:rPr lang="en-US" smtClean="0"/>
-              <a:t>1/9/2022</a:t>
+              <a:t>3/2/2022</a:t>
             </a:fld>
             <a:endParaRPr lang="en-US"/>
           </a:p>
@@ -3764,7 +3769,7 @@
           <a:p>
             <a:fld id="{CFA30225-6533-4C0E-9BA0-6341D2E3A1C7}" type="datetimeFigureOut">
               <a:rPr lang="en-US" smtClean="0"/>
-              <a:t>1/9/2022</a:t>
+              <a:t>3/2/2022</a:t>
             </a:fld>
             <a:endParaRPr lang="en-US"/>
           </a:p>
@@ -4158,7 +4163,7 @@
           <a:p>
             <a:fld id="{CFA30225-6533-4C0E-9BA0-6341D2E3A1C7}" type="datetimeFigureOut">
               <a:rPr lang="en-US" smtClean="0"/>
-              <a:t>1/9/2022</a:t>
+              <a:t>3/2/2022</a:t>
             </a:fld>
             <a:endParaRPr lang="en-US"/>
           </a:p>
@@ -4307,7 +4312,7 @@
           <a:p>
             <a:fld id="{CFA30225-6533-4C0E-9BA0-6341D2E3A1C7}" type="datetimeFigureOut">
               <a:rPr lang="en-US" smtClean="0"/>
-              <a:t>1/9/2022</a:t>
+              <a:t>3/2/2022</a:t>
             </a:fld>
             <a:endParaRPr lang="en-US"/>
           </a:p>
@@ -4433,7 +4438,7 @@
           <a:p>
             <a:fld id="{CFA30225-6533-4C0E-9BA0-6341D2E3A1C7}" type="datetimeFigureOut">
               <a:rPr lang="en-US" smtClean="0"/>
-              <a:t>1/9/2022</a:t>
+              <a:t>3/2/2022</a:t>
             </a:fld>
             <a:endParaRPr lang="en-US"/>
           </a:p>
@@ -4688,7 +4693,7 @@
           <a:p>
             <a:fld id="{CFA30225-6533-4C0E-9BA0-6341D2E3A1C7}" type="datetimeFigureOut">
               <a:rPr lang="en-US" smtClean="0"/>
-              <a:t>1/9/2022</a:t>
+              <a:t>3/2/2022</a:t>
             </a:fld>
             <a:endParaRPr lang="en-US"/>
           </a:p>
@@ -5003,7 +5008,7 @@
           <a:p>
             <a:fld id="{CFA30225-6533-4C0E-9BA0-6341D2E3A1C7}" type="datetimeFigureOut">
               <a:rPr lang="en-US" smtClean="0"/>
-              <a:t>1/9/2022</a:t>
+              <a:t>3/2/2022</a:t>
             </a:fld>
             <a:endParaRPr lang="en-US"/>
           </a:p>
@@ -5354,7 +5359,7 @@
           <a:p>
             <a:fld id="{CFA30225-6533-4C0E-9BA0-6341D2E3A1C7}" type="datetimeFigureOut">
               <a:rPr lang="en-US" smtClean="0"/>
-              <a:t>1/9/2022</a:t>
+              <a:t>3/2/2022</a:t>
             </a:fld>
             <a:endParaRPr lang="en-US"/>
           </a:p>
@@ -6037,12 +6042,13 @@
           <a:p>
             <a:r>
               <a:rPr lang="tr-TR" b="1" u="sng" dirty="0" err="1" smtClean="0"/>
-              <a:t>Lecturer</a:t>
+              <a:t>Instructor</a:t>
             </a:r>
             <a:r>
               <a:rPr lang="tr-TR" b="1" u="sng" dirty="0" smtClean="0"/>
               <a:t>:</a:t>
             </a:r>
+            <a:endParaRPr lang="tr-TR" b="1" u="sng" dirty="0" smtClean="0"/>
           </a:p>
           <a:p>
             <a:r>
@@ -7147,11 +7153,7 @@
           <a:p>
             <a:r>
               <a:rPr lang="tr-TR" dirty="0" smtClean="0"/>
-              <a:t>Reference</a:t>
-            </a:r>
-            <a:r>
-              <a:rPr lang="tr-TR" dirty="0" smtClean="0"/>
-              <a:t>(</a:t>
+              <a:t>Reference(</a:t>
             </a:r>
             <a:r>
               <a:rPr lang="en-US" dirty="0"/>
@@ -8132,11 +8134,7 @@
           <a:p>
             <a:r>
               <a:rPr lang="tr-TR" sz="1300" dirty="0" smtClean="0"/>
-              <a:t>    </a:t>
-            </a:r>
-            <a:r>
-              <a:rPr lang="tr-TR" sz="1300" dirty="0" smtClean="0"/>
-              <a:t>Technical </a:t>
+              <a:t>    Technical </a:t>
             </a:r>
             <a:r>
               <a:rPr lang="tr-TR" sz="1300" dirty="0"/>
@@ -8540,11 +8538,7 @@
             </a:r>
             <a:r>
               <a:rPr lang="tr-TR" sz="1600" b="1" u="sng" dirty="0" smtClean="0"/>
-              <a:t>2 </a:t>
-            </a:r>
-            <a:r>
-              <a:rPr lang="tr-TR" sz="1600" b="1" u="sng" dirty="0" smtClean="0"/>
-              <a:t>:</a:t>
+              <a:t>2 :</a:t>
             </a:r>
             <a:endParaRPr lang="tr-TR" sz="1300" dirty="0" smtClean="0"/>
           </a:p>
@@ -12227,7 +12221,7 @@
         <p:spPr>
           <a:xfrm>
             <a:off x="1295402" y="4287923"/>
-            <a:ext cx="4721350" cy="1677382"/>
+            <a:ext cx="4721350" cy="938719"/>
           </a:xfrm>
           <a:prstGeom prst="rect">
             <a:avLst/>
@@ -12292,168 +12286,16 @@
               <a:t>   </a:t>
             </a:r>
             <a:r>
-              <a:rPr lang="tr-TR" sz="1200" dirty="0"/>
-              <a:t>Technical </a:t>
-            </a:r>
-            <a:r>
-              <a:rPr lang="tr-TR" sz="1200" dirty="0" err="1"/>
-              <a:t>Practise</a:t>
-            </a:r>
-            <a:endParaRPr lang="tr-TR" sz="1200" dirty="0"/>
-          </a:p>
-          <a:p>
-            <a:r>
-              <a:rPr lang="tr-TR" sz="1200" dirty="0"/>
-              <a:t>        - </a:t>
+              <a:rPr lang="tr-TR" sz="1300" dirty="0" smtClean="0"/>
+              <a:t>Final </a:t>
+            </a:r>
+            <a:r>
+              <a:rPr lang="tr-TR" sz="1200" dirty="0" smtClean="0"/>
+              <a:t>Project </a:t>
             </a:r>
             <a:r>
               <a:rPr lang="tr-TR" sz="1200" dirty="0" err="1" smtClean="0"/>
-              <a:t>Creating</a:t>
-            </a:r>
-            <a:r>
-              <a:rPr lang="tr-TR" sz="1200" dirty="0" smtClean="0"/>
-              <a:t> </a:t>
-            </a:r>
-            <a:r>
-              <a:rPr lang="tr-TR" sz="1200" dirty="0" err="1" smtClean="0"/>
-              <a:t>new</a:t>
-            </a:r>
-            <a:r>
-              <a:rPr lang="tr-TR" sz="1200" dirty="0" smtClean="0"/>
-              <a:t> Spring </a:t>
-            </a:r>
-            <a:r>
-              <a:rPr lang="tr-TR" sz="1200" dirty="0" err="1" smtClean="0"/>
-              <a:t>Boot</a:t>
-            </a:r>
-            <a:r>
-              <a:rPr lang="tr-TR" sz="1200" dirty="0" smtClean="0"/>
-              <a:t> Project </a:t>
-            </a:r>
-            <a:r>
-              <a:rPr lang="tr-TR" sz="1200" dirty="0" err="1" smtClean="0"/>
-              <a:t>from</a:t>
-            </a:r>
-            <a:r>
-              <a:rPr lang="tr-TR" sz="1200" dirty="0" smtClean="0"/>
-              <a:t> </a:t>
-            </a:r>
-            <a:r>
-              <a:rPr lang="tr-TR" sz="1200" dirty="0" err="1" smtClean="0"/>
-              <a:t>Scratch</a:t>
-            </a:r>
-            <a:endParaRPr lang="tr-TR" sz="1200" dirty="0" smtClean="0"/>
-          </a:p>
-          <a:p>
-            <a:r>
-              <a:rPr lang="tr-TR" sz="1200" dirty="0"/>
-              <a:t> </a:t>
-            </a:r>
-            <a:r>
-              <a:rPr lang="tr-TR" sz="1200" dirty="0" smtClean="0"/>
-              <a:t>         &amp; </a:t>
-            </a:r>
-            <a:r>
-              <a:rPr lang="tr-TR" sz="1200" dirty="0" err="1" smtClean="0"/>
-              <a:t>appllying</a:t>
-            </a:r>
-            <a:r>
-              <a:rPr lang="tr-TR" sz="1200" dirty="0" smtClean="0"/>
-              <a:t> </a:t>
-            </a:r>
-            <a:r>
-              <a:rPr lang="tr-TR" sz="1200" dirty="0" err="1" smtClean="0"/>
-              <a:t>all</a:t>
-            </a:r>
-            <a:r>
-              <a:rPr lang="tr-TR" sz="1200" dirty="0" smtClean="0"/>
-              <a:t> </a:t>
-            </a:r>
-            <a:r>
-              <a:rPr lang="tr-TR" sz="1200" dirty="0" err="1" smtClean="0"/>
-              <a:t>what</a:t>
-            </a:r>
-            <a:r>
-              <a:rPr lang="tr-TR" sz="1200" dirty="0" smtClean="0"/>
-              <a:t> </a:t>
-            </a:r>
-            <a:r>
-              <a:rPr lang="tr-TR" sz="1200" dirty="0" err="1" smtClean="0"/>
-              <a:t>we</a:t>
-            </a:r>
-            <a:r>
-              <a:rPr lang="tr-TR" sz="1200" dirty="0" smtClean="0"/>
-              <a:t> </a:t>
-            </a:r>
-            <a:r>
-              <a:rPr lang="tr-TR" sz="1200" dirty="0" err="1" smtClean="0"/>
-              <a:t>learn</a:t>
-            </a:r>
-            <a:endParaRPr lang="tr-TR" sz="1200" dirty="0"/>
-          </a:p>
-          <a:p>
-            <a:r>
-              <a:rPr lang="tr-TR" sz="1200" dirty="0" smtClean="0"/>
-              <a:t>          &amp; </a:t>
-            </a:r>
-            <a:r>
-              <a:rPr lang="tr-TR" sz="1200" dirty="0" err="1" smtClean="0"/>
-              <a:t>communicate</a:t>
-            </a:r>
-            <a:r>
-              <a:rPr lang="tr-TR" sz="1200" dirty="0" smtClean="0"/>
-              <a:t> </a:t>
-            </a:r>
-            <a:r>
-              <a:rPr lang="tr-TR" sz="1200" dirty="0" err="1" smtClean="0"/>
-              <a:t>with</a:t>
-            </a:r>
-            <a:r>
-              <a:rPr lang="tr-TR" sz="1200" dirty="0" smtClean="0"/>
-              <a:t> </a:t>
-            </a:r>
-            <a:r>
-              <a:rPr lang="tr-TR" sz="1200" dirty="0" err="1" smtClean="0"/>
-              <a:t>the</a:t>
-            </a:r>
-            <a:r>
-              <a:rPr lang="tr-TR" sz="1200" dirty="0" smtClean="0"/>
-              <a:t> </a:t>
-            </a:r>
-            <a:r>
-              <a:rPr lang="tr-TR" sz="1200" dirty="0" err="1" smtClean="0"/>
-              <a:t>older</a:t>
-            </a:r>
-            <a:r>
-              <a:rPr lang="tr-TR" sz="1200" dirty="0" smtClean="0"/>
-              <a:t> </a:t>
-            </a:r>
-            <a:r>
-              <a:rPr lang="tr-TR" sz="1200" dirty="0" err="1" smtClean="0"/>
-              <a:t>Microservice</a:t>
-            </a:r>
-            <a:endParaRPr lang="tr-TR" sz="1200" dirty="0" smtClean="0"/>
-          </a:p>
-          <a:p>
-            <a:r>
-              <a:rPr lang="tr-TR" sz="1200" dirty="0"/>
-              <a:t> </a:t>
-            </a:r>
-            <a:r>
-              <a:rPr lang="tr-TR" sz="1200" dirty="0" smtClean="0"/>
-              <a:t>         &amp; </a:t>
-            </a:r>
-            <a:r>
-              <a:rPr lang="tr-TR" sz="1200" dirty="0" err="1" smtClean="0"/>
-              <a:t>Swagger</a:t>
-            </a:r>
-            <a:r>
-              <a:rPr lang="tr-TR" sz="1200" dirty="0" smtClean="0"/>
-              <a:t> </a:t>
-            </a:r>
-            <a:r>
-              <a:rPr lang="tr-TR" sz="1200" dirty="0" smtClean="0"/>
-              <a:t>Integration</a:t>
+              <a:t>Presentations</a:t>
             </a:r>
             <a:endParaRPr lang="tr-TR" sz="1200" dirty="0"/>
           </a:p>
@@ -12528,12 +12370,8 @@
           </a:p>
           <a:p>
             <a:r>
-              <a:rPr lang="tr-TR" sz="1300" dirty="0"/>
-              <a:t> </a:t>
-            </a:r>
-            <a:r>
               <a:rPr lang="tr-TR" sz="1300" dirty="0" smtClean="0"/>
-              <a:t>   H2 DB </a:t>
+              <a:t>    H2 DB </a:t>
             </a:r>
             <a:r>
               <a:rPr lang="tr-TR" sz="1300" dirty="0" err="1" smtClean="0"/>
@@ -12559,12 +12397,8 @@
           </a:p>
           <a:p>
             <a:r>
-              <a:rPr lang="tr-TR" sz="1300" dirty="0"/>
-              <a:t> </a:t>
-            </a:r>
-            <a:r>
               <a:rPr lang="tr-TR" sz="1300" dirty="0" smtClean="0"/>
-              <a:t>   </a:t>
+              <a:t>    </a:t>
             </a:r>
             <a:r>
               <a:rPr lang="tr-TR" sz="1300" dirty="0" err="1" smtClean="0"/>
@@ -12578,7 +12412,11 @@
           <a:p>
             <a:r>
               <a:rPr lang="tr-TR" sz="1300" dirty="0" smtClean="0"/>
-              <a:t>    Technical </a:t>
+              <a:t>    </a:t>
+            </a:r>
+            <a:r>
+              <a:rPr lang="tr-TR" sz="1300" dirty="0" smtClean="0"/>
+              <a:t>Technical </a:t>
             </a:r>
             <a:r>
               <a:rPr lang="tr-TR" sz="1300" dirty="0" err="1"/>

</xml_diff>